<commit_message>
Fix #3, #4, #5 & Update
</commit_message>
<xml_diff>
--- a/PPT/python4.pptx
+++ b/PPT/python4.pptx
@@ -163,6 +163,29 @@
 <file path=ppt/changesInfos/changesInfo1.xml><?xml version="1.0" encoding="utf-8"?>
 <pc:chgInfo xmlns:a="http://schemas.openxmlformats.org/drawingml/2006/main" xmlns:r="http://schemas.openxmlformats.org/officeDocument/2006/relationships" xmlns:ac="http://schemas.microsoft.com/office/drawing/2013/main/command" xmlns:pc="http://schemas.microsoft.com/office/powerpoint/2013/main/command">
   <pc:docChgLst>
+    <pc:chgData name="Scruel Tao" userId="5ea5c98d59b44d4b" providerId="LiveId" clId="{8F427B29-2E76-438F-89BD-20EB05370BBC}"/>
+    <pc:docChg chg="modSld">
+      <pc:chgData name="Scruel Tao" userId="5ea5c98d59b44d4b" providerId="LiveId" clId="{8F427B29-2E76-438F-89BD-20EB05370BBC}" dt="2023-12-13T08:47:38.468" v="8"/>
+      <pc:docMkLst>
+        <pc:docMk/>
+      </pc:docMkLst>
+      <pc:sldChg chg="modNotesTx">
+        <pc:chgData name="Scruel Tao" userId="5ea5c98d59b44d4b" providerId="LiveId" clId="{8F427B29-2E76-438F-89BD-20EB05370BBC}" dt="2023-12-13T08:47:38.468" v="8"/>
+        <pc:sldMkLst>
+          <pc:docMk/>
+          <pc:sldMk cId="498494693" sldId="289"/>
+        </pc:sldMkLst>
+      </pc:sldChg>
+      <pc:sldChg chg="modNotesTx">
+        <pc:chgData name="Scruel Tao" userId="5ea5c98d59b44d4b" providerId="LiveId" clId="{8F427B29-2E76-438F-89BD-20EB05370BBC}" dt="2023-12-13T08:47:34.727" v="7" actId="20577"/>
+        <pc:sldMkLst>
+          <pc:docMk/>
+          <pc:sldMk cId="166521594" sldId="305"/>
+        </pc:sldMkLst>
+      </pc:sldChg>
+    </pc:docChg>
+  </pc:docChgLst>
+  <pc:docChgLst>
     <pc:chgData name="Scruel Tao" userId="5ea5c98d59b44d4b" providerId="LiveId" clId="{A52ED264-C864-416B-BFF4-46855FE833A0}"/>
     <pc:docChg chg="undo redo custSel addSld delSld modSld modMainMaster">
       <pc:chgData name="Scruel Tao" userId="5ea5c98d59b44d4b" providerId="LiveId" clId="{A52ED264-C864-416B-BFF4-46855FE833A0}" dt="2023-04-25T06:04:49.595" v="147" actId="47"/>
@@ -5565,7 +5588,7 @@
           <a:p>
             <a:fld id="{AC7E1972-C479-4420-A687-8FB83BA90DEB}" type="datetimeFigureOut">
               <a:rPr lang="zh-CN" altLang="en-US" smtClean="0"/>
-              <a:t>2023-12-11</a:t>
+              <a:t>2023-12-13</a:t>
             </a:fld>
             <a:endParaRPr lang="zh-CN" altLang="en-US"/>
           </a:p>
@@ -5742,7 +5765,7 @@
           <a:p>
             <a:fld id="{89B7AB8D-BCC0-43C6-B24C-055A25DB558F}" type="datetimeFigureOut">
               <a:rPr lang="zh-CN" altLang="en-US" smtClean="0"/>
-              <a:t>2023-12-11</a:t>
+              <a:t>2023-12-13</a:t>
             </a:fld>
             <a:endParaRPr lang="zh-CN" altLang="en-US"/>
           </a:p>
@@ -7442,6 +7465,12 @@
           <a:lstStyle/>
           <a:p>
             <a:r>
+              <a:rPr lang="zh-CN" altLang="en-US" sz="1200" b="0" i="0" u="none" strike="noStrike" baseline="0" dirty="0">
+                <a:latin typeface="FZKTJW--GB1-0"/>
+              </a:rPr>
+              <a:t>注：</a:t>
+            </a:r>
+            <a:r>
               <a:rPr lang="zh-CN" altLang="en-US" dirty="0"/>
               <a:t>这里调整了章节顺序，便于比对</a:t>
             </a:r>
@@ -9682,7 +9711,7 @@
           <a:p>
             <a:fld id="{F721228B-0167-4061-A906-8575043315EE}" type="datetimeFigureOut">
               <a:rPr lang="zh-CN" altLang="en-US" smtClean="0"/>
-              <a:t>2023-12-11</a:t>
+              <a:t>2023-12-13</a:t>
             </a:fld>
             <a:endParaRPr lang="zh-CN" altLang="en-US"/>
           </a:p>
@@ -9892,7 +9921,7 @@
           <a:p>
             <a:fld id="{F721228B-0167-4061-A906-8575043315EE}" type="datetimeFigureOut">
               <a:rPr lang="zh-CN" altLang="en-US" smtClean="0"/>
-              <a:t>2023-12-11</a:t>
+              <a:t>2023-12-13</a:t>
             </a:fld>
             <a:endParaRPr lang="zh-CN" altLang="en-US"/>
           </a:p>
@@ -10112,7 +10141,7 @@
           <a:p>
             <a:fld id="{F721228B-0167-4061-A906-8575043315EE}" type="datetimeFigureOut">
               <a:rPr lang="zh-CN" altLang="en-US" smtClean="0"/>
-              <a:t>2023-12-11</a:t>
+              <a:t>2023-12-13</a:t>
             </a:fld>
             <a:endParaRPr lang="zh-CN" altLang="en-US"/>
           </a:p>
@@ -10609,7 +10638,7 @@
           <a:p>
             <a:fld id="{F721228B-0167-4061-A906-8575043315EE}" type="datetimeFigureOut">
               <a:rPr lang="zh-CN" altLang="en-US" smtClean="0"/>
-              <a:t>2023-12-11</a:t>
+              <a:t>2023-12-13</a:t>
             </a:fld>
             <a:endParaRPr lang="zh-CN" altLang="en-US"/>
           </a:p>
@@ -10945,7 +10974,7 @@
           <a:p>
             <a:fld id="{F721228B-0167-4061-A906-8575043315EE}" type="datetimeFigureOut">
               <a:rPr lang="zh-CN" altLang="en-US" smtClean="0"/>
-              <a:t>2023-12-11</a:t>
+              <a:t>2023-12-13</a:t>
             </a:fld>
             <a:endParaRPr lang="zh-CN" altLang="en-US"/>
           </a:p>
@@ -11303,7 +11332,7 @@
           <a:p>
             <a:fld id="{F721228B-0167-4061-A906-8575043315EE}" type="datetimeFigureOut">
               <a:rPr lang="zh-CN" altLang="en-US" smtClean="0"/>
-              <a:t>2023-12-11</a:t>
+              <a:t>2023-12-13</a:t>
             </a:fld>
             <a:endParaRPr lang="zh-CN" altLang="en-US"/>
           </a:p>
@@ -11776,7 +11805,7 @@
           <a:p>
             <a:fld id="{F721228B-0167-4061-A906-8575043315EE}" type="datetimeFigureOut">
               <a:rPr lang="zh-CN" altLang="en-US" smtClean="0"/>
-              <a:t>2023-12-11</a:t>
+              <a:t>2023-12-13</a:t>
             </a:fld>
             <a:endParaRPr lang="zh-CN" altLang="en-US"/>
           </a:p>
@@ -11929,7 +11958,7 @@
           <a:p>
             <a:fld id="{F721228B-0167-4061-A906-8575043315EE}" type="datetimeFigureOut">
               <a:rPr lang="zh-CN" altLang="en-US" smtClean="0"/>
-              <a:t>2023-12-11</a:t>
+              <a:t>2023-12-13</a:t>
             </a:fld>
             <a:endParaRPr lang="zh-CN" altLang="en-US"/>
           </a:p>
@@ -12054,7 +12083,7 @@
           <a:p>
             <a:fld id="{F721228B-0167-4061-A906-8575043315EE}" type="datetimeFigureOut">
               <a:rPr lang="zh-CN" altLang="en-US" smtClean="0"/>
-              <a:t>2023-12-11</a:t>
+              <a:t>2023-12-13</a:t>
             </a:fld>
             <a:endParaRPr lang="zh-CN" altLang="en-US"/>
           </a:p>
@@ -12377,7 +12406,7 @@
           <a:p>
             <a:fld id="{F721228B-0167-4061-A906-8575043315EE}" type="datetimeFigureOut">
               <a:rPr lang="zh-CN" altLang="en-US" smtClean="0"/>
-              <a:t>2023-12-11</a:t>
+              <a:t>2023-12-13</a:t>
             </a:fld>
             <a:endParaRPr lang="zh-CN" altLang="en-US"/>
           </a:p>
@@ -12677,7 +12706,7 @@
           <a:p>
             <a:fld id="{F721228B-0167-4061-A906-8575043315EE}" type="datetimeFigureOut">
               <a:rPr lang="zh-CN" altLang="en-US" smtClean="0"/>
-              <a:t>2023-12-11</a:t>
+              <a:t>2023-12-13</a:t>
             </a:fld>
             <a:endParaRPr lang="zh-CN" altLang="en-US"/>
           </a:p>
@@ -12930,7 +12959,7 @@
           <a:p>
             <a:fld id="{F721228B-0167-4061-A906-8575043315EE}" type="datetimeFigureOut">
               <a:rPr lang="zh-CN" altLang="en-US" smtClean="0"/>
-              <a:t>2023-12-11</a:t>
+              <a:t>2023-12-13</a:t>
             </a:fld>
             <a:endParaRPr lang="zh-CN" altLang="en-US"/>
           </a:p>

</xml_diff>